<commit_message>
Fixed Yong Wei's UID
Former-commit-id: 03b5b216b30093b5abd0ecb6698b6a29c7933718
</commit_message>
<xml_diff>
--- a/Documentation/Semester_2/Sprint_0/Powerpoint/Team_Members.pptx
+++ b/Documentation/Semester_2/Sprint_0/Powerpoint/Team_Members.pptx
@@ -244,7 +244,7 @@
           <a:p>
             <a:fld id="{1430BD5D-C2E1-40C2-9978-3EB63EEA8230}" type="datetimeFigureOut">
               <a:rPr lang="en-NZ" smtClean="0"/>
-              <a:t>7/08/2018</a:t>
+              <a:t>21/08/2018</a:t>
             </a:fld>
             <a:endParaRPr lang="en-NZ"/>
           </a:p>
@@ -414,7 +414,7 @@
           <a:p>
             <a:fld id="{1430BD5D-C2E1-40C2-9978-3EB63EEA8230}" type="datetimeFigureOut">
               <a:rPr lang="en-NZ" smtClean="0"/>
-              <a:t>7/08/2018</a:t>
+              <a:t>21/08/2018</a:t>
             </a:fld>
             <a:endParaRPr lang="en-NZ"/>
           </a:p>
@@ -594,7 +594,7 @@
           <a:p>
             <a:fld id="{1430BD5D-C2E1-40C2-9978-3EB63EEA8230}" type="datetimeFigureOut">
               <a:rPr lang="en-NZ" smtClean="0"/>
-              <a:t>7/08/2018</a:t>
+              <a:t>21/08/2018</a:t>
             </a:fld>
             <a:endParaRPr lang="en-NZ"/>
           </a:p>
@@ -764,7 +764,7 @@
           <a:p>
             <a:fld id="{1430BD5D-C2E1-40C2-9978-3EB63EEA8230}" type="datetimeFigureOut">
               <a:rPr lang="en-NZ" smtClean="0"/>
-              <a:t>7/08/2018</a:t>
+              <a:t>21/08/2018</a:t>
             </a:fld>
             <a:endParaRPr lang="en-NZ"/>
           </a:p>
@@ -1010,7 +1010,7 @@
           <a:p>
             <a:fld id="{1430BD5D-C2E1-40C2-9978-3EB63EEA8230}" type="datetimeFigureOut">
               <a:rPr lang="en-NZ" smtClean="0"/>
-              <a:t>7/08/2018</a:t>
+              <a:t>21/08/2018</a:t>
             </a:fld>
             <a:endParaRPr lang="en-NZ"/>
           </a:p>
@@ -1242,7 +1242,7 @@
           <a:p>
             <a:fld id="{1430BD5D-C2E1-40C2-9978-3EB63EEA8230}" type="datetimeFigureOut">
               <a:rPr lang="en-NZ" smtClean="0"/>
-              <a:t>7/08/2018</a:t>
+              <a:t>21/08/2018</a:t>
             </a:fld>
             <a:endParaRPr lang="en-NZ"/>
           </a:p>
@@ -1609,7 +1609,7 @@
           <a:p>
             <a:fld id="{1430BD5D-C2E1-40C2-9978-3EB63EEA8230}" type="datetimeFigureOut">
               <a:rPr lang="en-NZ" smtClean="0"/>
-              <a:t>7/08/2018</a:t>
+              <a:t>21/08/2018</a:t>
             </a:fld>
             <a:endParaRPr lang="en-NZ"/>
           </a:p>
@@ -1727,7 +1727,7 @@
           <a:p>
             <a:fld id="{1430BD5D-C2E1-40C2-9978-3EB63EEA8230}" type="datetimeFigureOut">
               <a:rPr lang="en-NZ" smtClean="0"/>
-              <a:t>7/08/2018</a:t>
+              <a:t>21/08/2018</a:t>
             </a:fld>
             <a:endParaRPr lang="en-NZ"/>
           </a:p>
@@ -1822,7 +1822,7 @@
           <a:p>
             <a:fld id="{1430BD5D-C2E1-40C2-9978-3EB63EEA8230}" type="datetimeFigureOut">
               <a:rPr lang="en-NZ" smtClean="0"/>
-              <a:t>7/08/2018</a:t>
+              <a:t>21/08/2018</a:t>
             </a:fld>
             <a:endParaRPr lang="en-NZ"/>
           </a:p>
@@ -2099,7 +2099,7 @@
           <a:p>
             <a:fld id="{1430BD5D-C2E1-40C2-9978-3EB63EEA8230}" type="datetimeFigureOut">
               <a:rPr lang="en-NZ" smtClean="0"/>
-              <a:t>7/08/2018</a:t>
+              <a:t>21/08/2018</a:t>
             </a:fld>
             <a:endParaRPr lang="en-NZ"/>
           </a:p>
@@ -2356,7 +2356,7 @@
           <a:p>
             <a:fld id="{1430BD5D-C2E1-40C2-9978-3EB63EEA8230}" type="datetimeFigureOut">
               <a:rPr lang="en-NZ" smtClean="0"/>
-              <a:t>7/08/2018</a:t>
+              <a:t>21/08/2018</a:t>
             </a:fld>
             <a:endParaRPr lang="en-NZ"/>
           </a:p>
@@ -2569,7 +2569,7 @@
           <a:p>
             <a:fld id="{1430BD5D-C2E1-40C2-9978-3EB63EEA8230}" type="datetimeFigureOut">
               <a:rPr lang="en-NZ" smtClean="0"/>
-              <a:t>7/08/2018</a:t>
+              <a:t>21/08/2018</a:t>
             </a:fld>
             <a:endParaRPr lang="en-NZ"/>
           </a:p>
@@ -5212,13 +5212,13 @@
           <a:p>
             <a:pPr algn="ctr"/>
             <a:r>
-              <a:rPr lang="en-US" sz="900" dirty="0">
+              <a:rPr lang="en-US" sz="900" dirty="0" smtClean="0">
                 <a:latin typeface="Avenir Medium" panose="02000603020000020003" pitchFamily="2" charset="0"/>
                 <a:hlinkClick r:id="rId11"/>
               </a:rPr>
-              <a:t>u6019071@anu.edu.au</a:t>
-            </a:r>
-            <a:endParaRPr lang="en-US" sz="900" dirty="0">
+              <a:t>u6033740@anu.edu.au</a:t>
+            </a:r>
+            <a:endParaRPr lang="en-US" sz="900" dirty="0" smtClean="0">
               <a:latin typeface="Avenir Medium" panose="02000603020000020003" pitchFamily="2" charset="0"/>
             </a:endParaRPr>
           </a:p>

</xml_diff>